<commit_message>
Generate time series plots
</commit_message>
<xml_diff>
--- a/Workflow/IB 516/IB_516_Project_Final_Report.pptx
+++ b/Workflow/IB 516/IB_516_Project_Final_Report.pptx
@@ -105,6 +105,11 @@
       </a:defRPr>
     </a:lvl9pPr>
   </p:defaultTextStyle>
+  <p:extLst>
+    <p:ext uri="{EFAFB233-063F-42B5-8137-9DF3F51BA10A}">
+      <p15:sldGuideLst xmlns:p15="http://schemas.microsoft.com/office/powerpoint/2012/main"/>
+    </p:ext>
+  </p:extLst>
 </p:presentation>
 </file>
 
@@ -3445,7 +3450,9 @@
         </p:nvSpPr>
         <p:spPr/>
         <p:txBody>
-          <a:bodyPr/>
+          <a:bodyPr>
+            <a:normAutofit fontScale="92500" lnSpcReduction="20000"/>
+          </a:bodyPr>
           <a:lstStyle/>
           <a:p>
             <a:r>
@@ -3463,10 +3470,9 @@
           <a:p>
             <a:pPr lvl="1"/>
             <a:r>
-              <a:rPr lang="en-US"/>
+              <a:rPr lang="en-US" dirty="0"/>
               <a:t>Extremely tedious</a:t>
             </a:r>
-            <a:endParaRPr lang="en-US" dirty="0"/>
           </a:p>
           <a:p>
             <a:r>
@@ -3480,6 +3486,35 @@
               <a:rPr lang="en-US" dirty="0"/>
               <a:t>Everything other than reports</a:t>
             </a:r>
+          </a:p>
+          <a:p>
+            <a:r>
+              <a:rPr lang="en-US" dirty="0"/>
+              <a:t>Show workflow of Raw Data </a:t>
+            </a:r>
+            <a:r>
+              <a:rPr lang="en-US" dirty="0">
+                <a:sym typeface="Wingdings" panose="05000000000000000000" pitchFamily="2" charset="2"/>
+              </a:rPr>
+              <a:t> Cleanup Code  Derived Data  Analysis Code  Figures for Time Series Plots and…</a:t>
+            </a:r>
+          </a:p>
+          <a:p>
+            <a:r>
+              <a:rPr lang="en-US" dirty="0">
+                <a:sym typeface="Wingdings" panose="05000000000000000000" pitchFamily="2" charset="2"/>
+              </a:rPr>
+              <a:t>Raw Data  Cleanup Code  Derived Data  GIS (explained in Work Flow.docx)  Figures</a:t>
+            </a:r>
+          </a:p>
+          <a:p>
+            <a:r>
+              <a:rPr lang="en-US" dirty="0">
+                <a:sym typeface="Wingdings" panose="05000000000000000000" pitchFamily="2" charset="2"/>
+              </a:rPr>
+              <a:t>Using color-blind friendly colors for spatial temperature maps</a:t>
+            </a:r>
+            <a:endParaRPr lang="en-US" dirty="0"/>
           </a:p>
         </p:txBody>
       </p:sp>

</xml_diff>